<commit_message>
update storage graph in dev guide
</commit_message>
<xml_diff>
--- a/docs/diagrams/StorageComponentClassDiagram.pptx
+++ b/docs/diagrams/StorageComponentClassDiagram.pptx
@@ -1,14 +1,14 @@
 
 <file path=ppt/presentation.xml><?xml version="1.0" encoding="utf-8"?>
-<p:presentation xmlns:a="http://schemas.openxmlformats.org/drawingml/2006/main" xmlns:r="http://schemas.openxmlformats.org/officeDocument/2006/relationships" xmlns:p="http://schemas.openxmlformats.org/presentationml/2006/main" saveSubsetFonts="1">
+<p:presentation xmlns:a="http://schemas.openxmlformats.org/drawingml/2006/main" xmlns:r="http://schemas.openxmlformats.org/officeDocument/2006/relationships" xmlns:p="http://schemas.openxmlformats.org/presentationml/2006/main">
   <p:sldMasterIdLst>
     <p:sldMasterId id="2147483648" r:id="rId1"/>
   </p:sldMasterIdLst>
   <p:notesMasterIdLst>
-    <p:notesMasterId r:id="rId3"/>
+    <p:notesMasterId r:id="rId4"/>
   </p:notesMasterIdLst>
   <p:sldIdLst>
-    <p:sldId id="264" r:id="rId2"/>
+    <p:sldId id="264" r:id="rId3"/>
   </p:sldIdLst>
   <p:sldSz cx="9144000" cy="6858000" type="screen4x3"/>
   <p:notesSz cx="6858000" cy="9144000"/>
@@ -192,7 +192,6 @@
           <a:p>
             <a:fld id="{F5CC4B3F-88C1-4FFA-B1B6-F41C21DC6924}" type="datetimeFigureOut">
               <a:rPr lang="en-US" smtClean="0"/>
-              <a:t>10/16/2016</a:t>
             </a:fld>
             <a:endParaRPr lang="en-US"/>
           </a:p>
@@ -259,6 +258,7 @@
               <a:rPr lang="en-US" smtClean="0"/>
               <a:t>Click to edit Master text styles</a:t>
             </a:r>
+            <a:endParaRPr lang="en-US" smtClean="0"/>
           </a:p>
           <a:p>
             <a:pPr lvl="1"/>
@@ -266,6 +266,7 @@
               <a:rPr lang="en-US" smtClean="0"/>
               <a:t>Second level</a:t>
             </a:r>
+            <a:endParaRPr lang="en-US" smtClean="0"/>
           </a:p>
           <a:p>
             <a:pPr lvl="2"/>
@@ -273,6 +274,7 @@
               <a:rPr lang="en-US" smtClean="0"/>
               <a:t>Third level</a:t>
             </a:r>
+            <a:endParaRPr lang="en-US" smtClean="0"/>
           </a:p>
           <a:p>
             <a:pPr lvl="3"/>
@@ -280,6 +282,7 @@
               <a:rPr lang="en-US" smtClean="0"/>
               <a:t>Fourth level</a:t>
             </a:r>
+            <a:endParaRPr lang="en-US" smtClean="0"/>
           </a:p>
           <a:p>
             <a:pPr lvl="4"/>
@@ -351,18 +354,12 @@
           <a:p>
             <a:fld id="{5A7AB025-77E3-4BD1-A2FD-B3183DBA47A3}" type="slidenum">
               <a:rPr lang="en-US" smtClean="0"/>
-              <a:t>‹#›</a:t>
             </a:fld>
             <a:endParaRPr lang="en-US"/>
           </a:p>
         </p:txBody>
       </p:sp>
     </p:spTree>
-    <p:extLst>
-      <p:ext uri="{BB962C8B-B14F-4D97-AF65-F5344CB8AC3E}">
-        <p14:creationId xmlns:p14="http://schemas.microsoft.com/office/powerpoint/2010/main" val="2023976206"/>
-      </p:ext>
-    </p:extLst>
   </p:cSld>
   <p:clrMap bg1="lt1" tx1="dk1" bg2="lt2" tx2="dk2" accent1="accent1" accent2="accent2" accent3="accent3" accent4="accent4" accent5="accent5" accent6="accent6" hlink="hlink" folHlink="folHlink"/>
   <p:notesStyle>
@@ -641,7 +638,6 @@
           <a:p>
             <a:fld id="{78C97017-6FC3-485B-9764-EAC9E56C1D49}" type="datetimeFigureOut">
               <a:rPr lang="en-US" smtClean="0"/>
-              <a:t>10/16/2016</a:t>
             </a:fld>
             <a:endParaRPr lang="en-US"/>
           </a:p>
@@ -683,18 +679,12 @@
           <a:p>
             <a:fld id="{FB34683C-161B-4520-BF45-B179E228CF2A}" type="slidenum">
               <a:rPr lang="en-US" smtClean="0"/>
-              <a:t>‹#›</a:t>
             </a:fld>
             <a:endParaRPr lang="en-US"/>
           </a:p>
         </p:txBody>
       </p:sp>
     </p:spTree>
-    <p:extLst>
-      <p:ext uri="{BB962C8B-B14F-4D97-AF65-F5344CB8AC3E}">
-        <p14:creationId xmlns:p14="http://schemas.microsoft.com/office/powerpoint/2010/main" val="3246593157"/>
-      </p:ext>
-    </p:extLst>
   </p:cSld>
   <p:clrMapOvr>
     <a:masterClrMapping/>
@@ -762,6 +752,7 @@
               <a:rPr lang="en-US" smtClean="0"/>
               <a:t>Click to edit Master text styles</a:t>
             </a:r>
+            <a:endParaRPr lang="en-US" smtClean="0"/>
           </a:p>
           <a:p>
             <a:pPr lvl="1"/>
@@ -769,6 +760,7 @@
               <a:rPr lang="en-US" smtClean="0"/>
               <a:t>Second level</a:t>
             </a:r>
+            <a:endParaRPr lang="en-US" smtClean="0"/>
           </a:p>
           <a:p>
             <a:pPr lvl="2"/>
@@ -776,6 +768,7 @@
               <a:rPr lang="en-US" smtClean="0"/>
               <a:t>Third level</a:t>
             </a:r>
+            <a:endParaRPr lang="en-US" smtClean="0"/>
           </a:p>
           <a:p>
             <a:pPr lvl="3"/>
@@ -783,6 +776,7 @@
               <a:rPr lang="en-US" smtClean="0"/>
               <a:t>Fourth level</a:t>
             </a:r>
+            <a:endParaRPr lang="en-US" smtClean="0"/>
           </a:p>
           <a:p>
             <a:pPr lvl="4"/>
@@ -811,7 +805,6 @@
           <a:p>
             <a:fld id="{78C97017-6FC3-485B-9764-EAC9E56C1D49}" type="datetimeFigureOut">
               <a:rPr lang="en-US" smtClean="0"/>
-              <a:t>10/16/2016</a:t>
             </a:fld>
             <a:endParaRPr lang="en-US"/>
           </a:p>
@@ -853,18 +846,12 @@
           <a:p>
             <a:fld id="{FB34683C-161B-4520-BF45-B179E228CF2A}" type="slidenum">
               <a:rPr lang="en-US" smtClean="0"/>
-              <a:t>‹#›</a:t>
             </a:fld>
             <a:endParaRPr lang="en-US"/>
           </a:p>
         </p:txBody>
       </p:sp>
     </p:spTree>
-    <p:extLst>
-      <p:ext uri="{BB962C8B-B14F-4D97-AF65-F5344CB8AC3E}">
-        <p14:creationId xmlns:p14="http://schemas.microsoft.com/office/powerpoint/2010/main" val="2707025021"/>
-      </p:ext>
-    </p:extLst>
   </p:cSld>
   <p:clrMapOvr>
     <a:masterClrMapping/>
@@ -942,6 +929,7 @@
               <a:rPr lang="en-US" smtClean="0"/>
               <a:t>Click to edit Master text styles</a:t>
             </a:r>
+            <a:endParaRPr lang="en-US" smtClean="0"/>
           </a:p>
           <a:p>
             <a:pPr lvl="1"/>
@@ -949,6 +937,7 @@
               <a:rPr lang="en-US" smtClean="0"/>
               <a:t>Second level</a:t>
             </a:r>
+            <a:endParaRPr lang="en-US" smtClean="0"/>
           </a:p>
           <a:p>
             <a:pPr lvl="2"/>
@@ -956,6 +945,7 @@
               <a:rPr lang="en-US" smtClean="0"/>
               <a:t>Third level</a:t>
             </a:r>
+            <a:endParaRPr lang="en-US" smtClean="0"/>
           </a:p>
           <a:p>
             <a:pPr lvl="3"/>
@@ -963,6 +953,7 @@
               <a:rPr lang="en-US" smtClean="0"/>
               <a:t>Fourth level</a:t>
             </a:r>
+            <a:endParaRPr lang="en-US" smtClean="0"/>
           </a:p>
           <a:p>
             <a:pPr lvl="4"/>
@@ -991,7 +982,6 @@
           <a:p>
             <a:fld id="{78C97017-6FC3-485B-9764-EAC9E56C1D49}" type="datetimeFigureOut">
               <a:rPr lang="en-US" smtClean="0"/>
-              <a:t>10/16/2016</a:t>
             </a:fld>
             <a:endParaRPr lang="en-US"/>
           </a:p>
@@ -1033,18 +1023,12 @@
           <a:p>
             <a:fld id="{FB34683C-161B-4520-BF45-B179E228CF2A}" type="slidenum">
               <a:rPr lang="en-US" smtClean="0"/>
-              <a:t>‹#›</a:t>
             </a:fld>
             <a:endParaRPr lang="en-US"/>
           </a:p>
         </p:txBody>
       </p:sp>
     </p:spTree>
-    <p:extLst>
-      <p:ext uri="{BB962C8B-B14F-4D97-AF65-F5344CB8AC3E}">
-        <p14:creationId xmlns:p14="http://schemas.microsoft.com/office/powerpoint/2010/main" val="568378986"/>
-      </p:ext>
-    </p:extLst>
   </p:cSld>
   <p:clrMapOvr>
     <a:masterClrMapping/>
@@ -1112,6 +1096,7 @@
               <a:rPr lang="en-US" smtClean="0"/>
               <a:t>Click to edit Master text styles</a:t>
             </a:r>
+            <a:endParaRPr lang="en-US" smtClean="0"/>
           </a:p>
           <a:p>
             <a:pPr lvl="1"/>
@@ -1119,6 +1104,7 @@
               <a:rPr lang="en-US" smtClean="0"/>
               <a:t>Second level</a:t>
             </a:r>
+            <a:endParaRPr lang="en-US" smtClean="0"/>
           </a:p>
           <a:p>
             <a:pPr lvl="2"/>
@@ -1126,6 +1112,7 @@
               <a:rPr lang="en-US" smtClean="0"/>
               <a:t>Third level</a:t>
             </a:r>
+            <a:endParaRPr lang="en-US" smtClean="0"/>
           </a:p>
           <a:p>
             <a:pPr lvl="3"/>
@@ -1133,6 +1120,7 @@
               <a:rPr lang="en-US" smtClean="0"/>
               <a:t>Fourth level</a:t>
             </a:r>
+            <a:endParaRPr lang="en-US" smtClean="0"/>
           </a:p>
           <a:p>
             <a:pPr lvl="4"/>
@@ -1161,7 +1149,6 @@
           <a:p>
             <a:fld id="{78C97017-6FC3-485B-9764-EAC9E56C1D49}" type="datetimeFigureOut">
               <a:rPr lang="en-US" smtClean="0"/>
-              <a:t>10/16/2016</a:t>
             </a:fld>
             <a:endParaRPr lang="en-US"/>
           </a:p>
@@ -1203,18 +1190,12 @@
           <a:p>
             <a:fld id="{FB34683C-161B-4520-BF45-B179E228CF2A}" type="slidenum">
               <a:rPr lang="en-US" smtClean="0"/>
-              <a:t>‹#›</a:t>
             </a:fld>
             <a:endParaRPr lang="en-US"/>
           </a:p>
         </p:txBody>
       </p:sp>
     </p:spTree>
-    <p:extLst>
-      <p:ext uri="{BB962C8B-B14F-4D97-AF65-F5344CB8AC3E}">
-        <p14:creationId xmlns:p14="http://schemas.microsoft.com/office/powerpoint/2010/main" val="266658052"/>
-      </p:ext>
-    </p:extLst>
   </p:cSld>
   <p:clrMapOvr>
     <a:masterClrMapping/>
@@ -1387,6 +1368,7 @@
               <a:rPr lang="en-US" smtClean="0"/>
               <a:t>Click to edit Master text styles</a:t>
             </a:r>
+            <a:endParaRPr lang="en-US" smtClean="0"/>
           </a:p>
         </p:txBody>
       </p:sp>
@@ -1407,7 +1389,6 @@
           <a:p>
             <a:fld id="{78C97017-6FC3-485B-9764-EAC9E56C1D49}" type="datetimeFigureOut">
               <a:rPr lang="en-US" smtClean="0"/>
-              <a:t>10/16/2016</a:t>
             </a:fld>
             <a:endParaRPr lang="en-US"/>
           </a:p>
@@ -1449,18 +1430,12 @@
           <a:p>
             <a:fld id="{FB34683C-161B-4520-BF45-B179E228CF2A}" type="slidenum">
               <a:rPr lang="en-US" smtClean="0"/>
-              <a:t>‹#›</a:t>
             </a:fld>
             <a:endParaRPr lang="en-US"/>
           </a:p>
         </p:txBody>
       </p:sp>
     </p:spTree>
-    <p:extLst>
-      <p:ext uri="{BB962C8B-B14F-4D97-AF65-F5344CB8AC3E}">
-        <p14:creationId xmlns:p14="http://schemas.microsoft.com/office/powerpoint/2010/main" val="474686344"/>
-      </p:ext>
-    </p:extLst>
   </p:cSld>
   <p:clrMapOvr>
     <a:masterClrMapping/>
@@ -1561,6 +1536,7 @@
               <a:rPr lang="en-US" smtClean="0"/>
               <a:t>Click to edit Master text styles</a:t>
             </a:r>
+            <a:endParaRPr lang="en-US" smtClean="0"/>
           </a:p>
           <a:p>
             <a:pPr lvl="1"/>
@@ -1568,6 +1544,7 @@
               <a:rPr lang="en-US" smtClean="0"/>
               <a:t>Second level</a:t>
             </a:r>
+            <a:endParaRPr lang="en-US" smtClean="0"/>
           </a:p>
           <a:p>
             <a:pPr lvl="2"/>
@@ -1575,6 +1552,7 @@
               <a:rPr lang="en-US" smtClean="0"/>
               <a:t>Third level</a:t>
             </a:r>
+            <a:endParaRPr lang="en-US" smtClean="0"/>
           </a:p>
           <a:p>
             <a:pPr lvl="3"/>
@@ -1582,6 +1560,7 @@
               <a:rPr lang="en-US" smtClean="0"/>
               <a:t>Fourth level</a:t>
             </a:r>
+            <a:endParaRPr lang="en-US" smtClean="0"/>
           </a:p>
           <a:p>
             <a:pPr lvl="4"/>
@@ -1646,6 +1625,7 @@
               <a:rPr lang="en-US" smtClean="0"/>
               <a:t>Click to edit Master text styles</a:t>
             </a:r>
+            <a:endParaRPr lang="en-US" smtClean="0"/>
           </a:p>
           <a:p>
             <a:pPr lvl="1"/>
@@ -1653,6 +1633,7 @@
               <a:rPr lang="en-US" smtClean="0"/>
               <a:t>Second level</a:t>
             </a:r>
+            <a:endParaRPr lang="en-US" smtClean="0"/>
           </a:p>
           <a:p>
             <a:pPr lvl="2"/>
@@ -1660,6 +1641,7 @@
               <a:rPr lang="en-US" smtClean="0"/>
               <a:t>Third level</a:t>
             </a:r>
+            <a:endParaRPr lang="en-US" smtClean="0"/>
           </a:p>
           <a:p>
             <a:pPr lvl="3"/>
@@ -1667,6 +1649,7 @@
               <a:rPr lang="en-US" smtClean="0"/>
               <a:t>Fourth level</a:t>
             </a:r>
+            <a:endParaRPr lang="en-US" smtClean="0"/>
           </a:p>
           <a:p>
             <a:pPr lvl="4"/>
@@ -1695,7 +1678,6 @@
           <a:p>
             <a:fld id="{78C97017-6FC3-485B-9764-EAC9E56C1D49}" type="datetimeFigureOut">
               <a:rPr lang="en-US" smtClean="0"/>
-              <a:t>10/16/2016</a:t>
             </a:fld>
             <a:endParaRPr lang="en-US"/>
           </a:p>
@@ -1737,18 +1719,12 @@
           <a:p>
             <a:fld id="{FB34683C-161B-4520-BF45-B179E228CF2A}" type="slidenum">
               <a:rPr lang="en-US" smtClean="0"/>
-              <a:t>‹#›</a:t>
             </a:fld>
             <a:endParaRPr lang="en-US"/>
           </a:p>
         </p:txBody>
       </p:sp>
     </p:spTree>
-    <p:extLst>
-      <p:ext uri="{BB962C8B-B14F-4D97-AF65-F5344CB8AC3E}">
-        <p14:creationId xmlns:p14="http://schemas.microsoft.com/office/powerpoint/2010/main" val="562293251"/>
-      </p:ext>
-    </p:extLst>
   </p:cSld>
   <p:clrMapOvr>
     <a:masterClrMapping/>
@@ -1862,6 +1838,7 @@
               <a:rPr lang="en-US" smtClean="0"/>
               <a:t>Click to edit Master text styles</a:t>
             </a:r>
+            <a:endParaRPr lang="en-US" smtClean="0"/>
           </a:p>
         </p:txBody>
       </p:sp>
@@ -1918,6 +1895,7 @@
               <a:rPr lang="en-US" smtClean="0"/>
               <a:t>Click to edit Master text styles</a:t>
             </a:r>
+            <a:endParaRPr lang="en-US" smtClean="0"/>
           </a:p>
           <a:p>
             <a:pPr lvl="1"/>
@@ -1925,6 +1903,7 @@
               <a:rPr lang="en-US" smtClean="0"/>
               <a:t>Second level</a:t>
             </a:r>
+            <a:endParaRPr lang="en-US" smtClean="0"/>
           </a:p>
           <a:p>
             <a:pPr lvl="2"/>
@@ -1932,6 +1911,7 @@
               <a:rPr lang="en-US" smtClean="0"/>
               <a:t>Third level</a:t>
             </a:r>
+            <a:endParaRPr lang="en-US" smtClean="0"/>
           </a:p>
           <a:p>
             <a:pPr lvl="3"/>
@@ -1939,6 +1919,7 @@
               <a:rPr lang="en-US" smtClean="0"/>
               <a:t>Fourth level</a:t>
             </a:r>
+            <a:endParaRPr lang="en-US" smtClean="0"/>
           </a:p>
           <a:p>
             <a:pPr lvl="4"/>
@@ -2012,6 +1993,7 @@
               <a:rPr lang="en-US" smtClean="0"/>
               <a:t>Click to edit Master text styles</a:t>
             </a:r>
+            <a:endParaRPr lang="en-US" smtClean="0"/>
           </a:p>
         </p:txBody>
       </p:sp>
@@ -2068,6 +2050,7 @@
               <a:rPr lang="en-US" smtClean="0"/>
               <a:t>Click to edit Master text styles</a:t>
             </a:r>
+            <a:endParaRPr lang="en-US" smtClean="0"/>
           </a:p>
           <a:p>
             <a:pPr lvl="1"/>
@@ -2075,6 +2058,7 @@
               <a:rPr lang="en-US" smtClean="0"/>
               <a:t>Second level</a:t>
             </a:r>
+            <a:endParaRPr lang="en-US" smtClean="0"/>
           </a:p>
           <a:p>
             <a:pPr lvl="2"/>
@@ -2082,6 +2066,7 @@
               <a:rPr lang="en-US" smtClean="0"/>
               <a:t>Third level</a:t>
             </a:r>
+            <a:endParaRPr lang="en-US" smtClean="0"/>
           </a:p>
           <a:p>
             <a:pPr lvl="3"/>
@@ -2089,6 +2074,7 @@
               <a:rPr lang="en-US" smtClean="0"/>
               <a:t>Fourth level</a:t>
             </a:r>
+            <a:endParaRPr lang="en-US" smtClean="0"/>
           </a:p>
           <a:p>
             <a:pPr lvl="4"/>
@@ -2117,7 +2103,6 @@
           <a:p>
             <a:fld id="{78C97017-6FC3-485B-9764-EAC9E56C1D49}" type="datetimeFigureOut">
               <a:rPr lang="en-US" smtClean="0"/>
-              <a:t>10/16/2016</a:t>
             </a:fld>
             <a:endParaRPr lang="en-US"/>
           </a:p>
@@ -2159,18 +2144,12 @@
           <a:p>
             <a:fld id="{FB34683C-161B-4520-BF45-B179E228CF2A}" type="slidenum">
               <a:rPr lang="en-US" smtClean="0"/>
-              <a:t>‹#›</a:t>
             </a:fld>
             <a:endParaRPr lang="en-US"/>
           </a:p>
         </p:txBody>
       </p:sp>
     </p:spTree>
-    <p:extLst>
-      <p:ext uri="{BB962C8B-B14F-4D97-AF65-F5344CB8AC3E}">
-        <p14:creationId xmlns:p14="http://schemas.microsoft.com/office/powerpoint/2010/main" val="1126424250"/>
-      </p:ext>
-    </p:extLst>
   </p:cSld>
   <p:clrMapOvr>
     <a:masterClrMapping/>
@@ -2235,7 +2214,6 @@
           <a:p>
             <a:fld id="{78C97017-6FC3-485B-9764-EAC9E56C1D49}" type="datetimeFigureOut">
               <a:rPr lang="en-US" smtClean="0"/>
-              <a:t>10/16/2016</a:t>
             </a:fld>
             <a:endParaRPr lang="en-US"/>
           </a:p>
@@ -2277,18 +2255,12 @@
           <a:p>
             <a:fld id="{FB34683C-161B-4520-BF45-B179E228CF2A}" type="slidenum">
               <a:rPr lang="en-US" smtClean="0"/>
-              <a:t>‹#›</a:t>
             </a:fld>
             <a:endParaRPr lang="en-US"/>
           </a:p>
         </p:txBody>
       </p:sp>
     </p:spTree>
-    <p:extLst>
-      <p:ext uri="{BB962C8B-B14F-4D97-AF65-F5344CB8AC3E}">
-        <p14:creationId xmlns:p14="http://schemas.microsoft.com/office/powerpoint/2010/main" val="4159724230"/>
-      </p:ext>
-    </p:extLst>
   </p:cSld>
   <p:clrMapOvr>
     <a:masterClrMapping/>
@@ -2330,7 +2302,6 @@
           <a:p>
             <a:fld id="{78C97017-6FC3-485B-9764-EAC9E56C1D49}" type="datetimeFigureOut">
               <a:rPr lang="en-US" smtClean="0"/>
-              <a:t>10/16/2016</a:t>
             </a:fld>
             <a:endParaRPr lang="en-US"/>
           </a:p>
@@ -2372,18 +2343,12 @@
           <a:p>
             <a:fld id="{FB34683C-161B-4520-BF45-B179E228CF2A}" type="slidenum">
               <a:rPr lang="en-US" smtClean="0"/>
-              <a:t>‹#›</a:t>
             </a:fld>
             <a:endParaRPr lang="en-US"/>
           </a:p>
         </p:txBody>
       </p:sp>
     </p:spTree>
-    <p:extLst>
-      <p:ext uri="{BB962C8B-B14F-4D97-AF65-F5344CB8AC3E}">
-        <p14:creationId xmlns:p14="http://schemas.microsoft.com/office/powerpoint/2010/main" val="1793928710"/>
-      </p:ext>
-    </p:extLst>
   </p:cSld>
   <p:clrMapOvr>
     <a:masterClrMapping/>
@@ -2493,6 +2458,7 @@
               <a:rPr lang="en-US" smtClean="0"/>
               <a:t>Click to edit Master text styles</a:t>
             </a:r>
+            <a:endParaRPr lang="en-US" smtClean="0"/>
           </a:p>
           <a:p>
             <a:pPr lvl="1"/>
@@ -2500,6 +2466,7 @@
               <a:rPr lang="en-US" smtClean="0"/>
               <a:t>Second level</a:t>
             </a:r>
+            <a:endParaRPr lang="en-US" smtClean="0"/>
           </a:p>
           <a:p>
             <a:pPr lvl="2"/>
@@ -2507,6 +2474,7 @@
               <a:rPr lang="en-US" smtClean="0"/>
               <a:t>Third level</a:t>
             </a:r>
+            <a:endParaRPr lang="en-US" smtClean="0"/>
           </a:p>
           <a:p>
             <a:pPr lvl="3"/>
@@ -2514,6 +2482,7 @@
               <a:rPr lang="en-US" smtClean="0"/>
               <a:t>Fourth level</a:t>
             </a:r>
+            <a:endParaRPr lang="en-US" smtClean="0"/>
           </a:p>
           <a:p>
             <a:pPr lvl="4"/>
@@ -2587,6 +2556,7 @@
               <a:rPr lang="en-US" smtClean="0"/>
               <a:t>Click to edit Master text styles</a:t>
             </a:r>
+            <a:endParaRPr lang="en-US" smtClean="0"/>
           </a:p>
         </p:txBody>
       </p:sp>
@@ -2607,7 +2577,6 @@
           <a:p>
             <a:fld id="{78C97017-6FC3-485B-9764-EAC9E56C1D49}" type="datetimeFigureOut">
               <a:rPr lang="en-US" smtClean="0"/>
-              <a:t>10/16/2016</a:t>
             </a:fld>
             <a:endParaRPr lang="en-US"/>
           </a:p>
@@ -2649,18 +2618,12 @@
           <a:p>
             <a:fld id="{FB34683C-161B-4520-BF45-B179E228CF2A}" type="slidenum">
               <a:rPr lang="en-US" smtClean="0"/>
-              <a:t>‹#›</a:t>
             </a:fld>
             <a:endParaRPr lang="en-US"/>
           </a:p>
         </p:txBody>
       </p:sp>
     </p:spTree>
-    <p:extLst>
-      <p:ext uri="{BB962C8B-B14F-4D97-AF65-F5344CB8AC3E}">
-        <p14:creationId xmlns:p14="http://schemas.microsoft.com/office/powerpoint/2010/main" val="2076802089"/>
-      </p:ext>
-    </p:extLst>
   </p:cSld>
   <p:clrMapOvr>
     <a:masterClrMapping/>
@@ -2840,6 +2803,7 @@
               <a:rPr lang="en-US" smtClean="0"/>
               <a:t>Click to edit Master text styles</a:t>
             </a:r>
+            <a:endParaRPr lang="en-US" smtClean="0"/>
           </a:p>
         </p:txBody>
       </p:sp>
@@ -2860,7 +2824,6 @@
           <a:p>
             <a:fld id="{78C97017-6FC3-485B-9764-EAC9E56C1D49}" type="datetimeFigureOut">
               <a:rPr lang="en-US" smtClean="0"/>
-              <a:t>10/16/2016</a:t>
             </a:fld>
             <a:endParaRPr lang="en-US"/>
           </a:p>
@@ -2902,18 +2865,12 @@
           <a:p>
             <a:fld id="{FB34683C-161B-4520-BF45-B179E228CF2A}" type="slidenum">
               <a:rPr lang="en-US" smtClean="0"/>
-              <a:t>‹#›</a:t>
             </a:fld>
             <a:endParaRPr lang="en-US"/>
           </a:p>
         </p:txBody>
       </p:sp>
     </p:spTree>
-    <p:extLst>
-      <p:ext uri="{BB962C8B-B14F-4D97-AF65-F5344CB8AC3E}">
-        <p14:creationId xmlns:p14="http://schemas.microsoft.com/office/powerpoint/2010/main" val="201835938"/>
-      </p:ext>
-    </p:extLst>
   </p:cSld>
   <p:clrMapOvr>
     <a:masterClrMapping/>
@@ -3006,6 +2963,7 @@
               <a:rPr lang="en-US" smtClean="0"/>
               <a:t>Click to edit Master text styles</a:t>
             </a:r>
+            <a:endParaRPr lang="en-US" smtClean="0"/>
           </a:p>
           <a:p>
             <a:pPr lvl="1"/>
@@ -3013,6 +2971,7 @@
               <a:rPr lang="en-US" smtClean="0"/>
               <a:t>Second level</a:t>
             </a:r>
+            <a:endParaRPr lang="en-US" smtClean="0"/>
           </a:p>
           <a:p>
             <a:pPr lvl="2"/>
@@ -3020,6 +2979,7 @@
               <a:rPr lang="en-US" smtClean="0"/>
               <a:t>Third level</a:t>
             </a:r>
+            <a:endParaRPr lang="en-US" smtClean="0"/>
           </a:p>
           <a:p>
             <a:pPr lvl="3"/>
@@ -3027,6 +2987,7 @@
               <a:rPr lang="en-US" smtClean="0"/>
               <a:t>Fourth level</a:t>
             </a:r>
+            <a:endParaRPr lang="en-US" smtClean="0"/>
           </a:p>
           <a:p>
             <a:pPr lvl="4"/>
@@ -3073,7 +3034,6 @@
           <a:p>
             <a:fld id="{78C97017-6FC3-485B-9764-EAC9E56C1D49}" type="datetimeFigureOut">
               <a:rPr lang="en-US" smtClean="0"/>
-              <a:t>10/16/2016</a:t>
             </a:fld>
             <a:endParaRPr lang="en-US"/>
           </a:p>
@@ -3151,18 +3111,12 @@
           <a:p>
             <a:fld id="{FB34683C-161B-4520-BF45-B179E228CF2A}" type="slidenum">
               <a:rPr lang="en-US" smtClean="0"/>
-              <a:t>‹#›</a:t>
             </a:fld>
             <a:endParaRPr lang="en-US"/>
           </a:p>
         </p:txBody>
       </p:sp>
     </p:spTree>
-    <p:extLst>
-      <p:ext uri="{BB962C8B-B14F-4D97-AF65-F5344CB8AC3E}">
-        <p14:creationId xmlns:p14="http://schemas.microsoft.com/office/powerpoint/2010/main" val="2341400630"/>
-      </p:ext>
-    </p:extLst>
   </p:cSld>
   <p:clrMap bg1="lt1" tx1="dk1" bg2="lt2" tx2="dk2" accent1="accent1" accent2="accent2" accent3="accent3" accent4="accent4" accent5="accent5" accent6="accent6" hlink="hlink" folHlink="folHlink"/>
   <p:sldLayoutIdLst>
@@ -3576,12 +3530,20 @@
               </a:rPr>
             </a:br>
             <a:r>
+              <a:rPr lang="en-GB" altLang="en-US" sz="1050" dirty="0" err="1" smtClean="0">
+                <a:solidFill>
+                  <a:schemeClr val="bg1"/>
+                </a:solidFill>
+              </a:rPr>
+              <a:t>TaskList</a:t>
+            </a:r>
+            <a:r>
               <a:rPr lang="en-US" sz="1050" dirty="0" err="1" smtClean="0">
                 <a:solidFill>
                   <a:schemeClr val="bg1"/>
                 </a:solidFill>
               </a:rPr>
-              <a:t>AddressBookStorage</a:t>
+              <a:t>Storage</a:t>
             </a:r>
             <a:endParaRPr lang="en-SG" sz="1050" dirty="0">
               <a:solidFill>
@@ -3709,6 +3671,11 @@
               </a:rPr>
               <a:t>&lt;&lt;interface&gt;&gt;</a:t>
             </a:r>
+            <a:endParaRPr lang="en-US" sz="1050" dirty="0">
+              <a:solidFill>
+                <a:schemeClr val="bg1"/>
+              </a:solidFill>
+            </a:endParaRPr>
           </a:p>
           <a:p>
             <a:pPr algn="ctr"/>
@@ -4154,17 +4121,17 @@
                   </a:schemeClr>
                 </a:solidFill>
               </a:rPr>
-              <a:t>XmlAddressBook</a:t>
-            </a:r>
-            <a:r>
-              <a:rPr lang="en-US" sz="1050" b="1" dirty="0" smtClean="0">
+              <a:t>Xml</a:t>
+            </a:r>
+            <a:r>
+              <a:rPr lang="en-GB" altLang="en-US" sz="1050" b="1" dirty="0" err="1" smtClean="0">
                 <a:solidFill>
                   <a:schemeClr val="accent6">
                     <a:lumMod val="75000"/>
                   </a:schemeClr>
                 </a:solidFill>
               </a:rPr>
-              <a:t/>
+              <a:t>TaskList</a:t>
             </a:r>
             <a:br>
               <a:rPr lang="en-US" sz="1050" b="1" dirty="0" smtClean="0">
@@ -4523,14 +4490,6 @@
               </a:rPr>
               <a:t>JsonUserPrefs</a:t>
             </a:r>
-            <a:r>
-              <a:rPr lang="en-US" sz="1050" dirty="0" smtClean="0">
-                <a:solidFill>
-                  <a:schemeClr val="bg1"/>
-                </a:solidFill>
-              </a:rPr>
-              <a:t/>
-            </a:r>
             <a:br>
               <a:rPr lang="en-US" sz="1050" dirty="0" smtClean="0">
                 <a:solidFill>
@@ -4600,16 +4559,6 @@
               </a:rPr>
               <a:t>XmlSerializable</a:t>
             </a:r>
-            <a:r>
-              <a:rPr lang="en-US" sz="1050" b="1" dirty="0" smtClean="0">
-                <a:solidFill>
-                  <a:schemeClr val="accent6">
-                    <a:lumMod val="75000"/>
-                  </a:schemeClr>
-                </a:solidFill>
-              </a:rPr>
-              <a:t/>
-            </a:r>
             <a:br>
               <a:rPr lang="en-US" sz="1050" b="1" dirty="0" smtClean="0">
                 <a:solidFill>
@@ -4620,16 +4569,16 @@
               </a:rPr>
             </a:br>
             <a:r>
-              <a:rPr lang="en-US" sz="1050" b="1" dirty="0" err="1" smtClean="0">
+              <a:rPr lang="en-GB" sz="1050" b="1" dirty="0" err="1" smtClean="0">
                 <a:solidFill>
                   <a:schemeClr val="accent6">
                     <a:lumMod val="75000"/>
                   </a:schemeClr>
                 </a:solidFill>
               </a:rPr>
-              <a:t>AddressBook</a:t>
-            </a:r>
-            <a:endParaRPr lang="en-SG" sz="1050" b="1" dirty="0">
+              <a:t>TaskList</a:t>
+            </a:r>
+            <a:endParaRPr lang="en-GB" sz="1050" b="1" dirty="0">
               <a:solidFill>
                 <a:schemeClr val="accent6">
                   <a:lumMod val="75000"/>
@@ -4780,9 +4729,19 @@
                   </a:schemeClr>
                 </a:solidFill>
               </a:rPr>
-              <a:t>XmlAdaptedPerson</a:t>
-            </a:r>
-            <a:endParaRPr lang="en-SG" sz="1050" b="1" dirty="0">
+              <a:t>XmlAdapted</a:t>
+            </a:r>
+            <a:r>
+              <a:rPr lang="en-GB" altLang="en-US" sz="1050" b="1" dirty="0" err="1" smtClean="0">
+                <a:solidFill>
+                  <a:schemeClr val="accent6">
+                    <a:lumMod val="75000"/>
+                  </a:schemeClr>
+                </a:solidFill>
+              </a:rPr>
+              <a:t>Task</a:t>
+            </a:r>
+            <a:endParaRPr lang="en-GB" altLang="en-US" sz="1050" b="1" dirty="0" err="1" smtClean="0">
               <a:solidFill>
                 <a:schemeClr val="accent6">
                   <a:lumMod val="75000"/>
@@ -4834,11 +4793,6 @@
         </p:style>
       </p:cxnSp>
     </p:spTree>
-    <p:extLst>
-      <p:ext uri="{BB962C8B-B14F-4D97-AF65-F5344CB8AC3E}">
-        <p14:creationId xmlns:p14="http://schemas.microsoft.com/office/powerpoint/2010/main" val="1478832369"/>
-      </p:ext>
-    </p:extLst>
   </p:cSld>
   <p:clrMapOvr>
     <a:masterClrMapping/>
@@ -5135,6 +5089,11 @@
   </a:themeElements>
   <a:objectDefaults/>
   <a:extraClrSchemeLst/>
+  <a:extLst>
+    <a:ext uri="{05A4C25C-085E-4340-85A3-A5531E510DB2}">
+      <thm15:themeFamily xmlns:thm15="http://schemas.microsoft.com/office/thememl/2012/main" name="Office Theme" id="{62F939B6-93AF-4DB8-9C6B-D6C7DFDC589F}" vid="{4A3C46E8-61CC-4603-A589-7422A47A8E4A}"/>
+    </a:ext>
+  </a:extLst>
 </a:theme>
 </file>
 
@@ -5420,5 +5379,10 @@
   </a:themeElements>
   <a:objectDefaults/>
   <a:extraClrSchemeLst/>
+  <a:extLst>
+    <a:ext uri="{05A4C25C-085E-4340-85A3-A5531E510DB2}">
+      <thm15:themeFamily xmlns:thm15="http://schemas.microsoft.com/office/thememl/2012/main" name="Office Theme" id="{62F939B6-93AF-4DB8-9C6B-D6C7DFDC589F}" vid="{4A3C46E8-61CC-4603-A589-7422A47A8E4A}"/>
+    </a:ext>
+  </a:extLst>
 </a:theme>
 </file>
</xml_diff>

<commit_message>
update diagrams for dev guide storage component
</commit_message>
<xml_diff>
--- a/docs/diagrams/StorageComponentClassDiagram.pptx
+++ b/docs/diagrams/StorageComponentClassDiagram.pptx
@@ -107,6 +107,22 @@
       </a:defRPr>
     </a:lvl9pPr>
   </p:defaultTextStyle>
+  <p:extLst>
+    <p:ext uri="{EFAFB233-063F-42B5-8137-9DF3F51BA10A}">
+      <p15:sldGuideLst xmlns:p15="http://schemas.microsoft.com/office/powerpoint/2012/main">
+        <p15:guide id="1" orient="horz" pos="1488">
+          <p15:clr>
+            <a:srgbClr val="A4A3A4"/>
+          </p15:clr>
+        </p15:guide>
+        <p15:guide id="2" pos="2880">
+          <p15:clr>
+            <a:srgbClr val="A4A3A4"/>
+          </p15:clr>
+        </p15:guide>
+      </p15:sldGuideLst>
+    </p:ext>
+  </p:extLst>
 </p:presentation>
 </file>
 
@@ -192,7 +208,7 @@
           <a:p>
             <a:fld id="{F5CC4B3F-88C1-4FFA-B1B6-F41C21DC6924}" type="datetimeFigureOut">
               <a:rPr lang="en-US" smtClean="0"/>
-              <a:t>10/16/2016</a:t>
+              <a:t>4/8/2017</a:t>
             </a:fld>
             <a:endParaRPr lang="en-US"/>
           </a:p>
@@ -256,38 +272,37 @@
           <a:p>
             <a:pPr lvl="0"/>
             <a:r>
-              <a:rPr lang="en-US" smtClean="0"/>
+              <a:rPr lang="en-US"/>
               <a:t>Click to edit Master text styles</a:t>
             </a:r>
           </a:p>
           <a:p>
             <a:pPr lvl="1"/>
             <a:r>
-              <a:rPr lang="en-US" smtClean="0"/>
+              <a:rPr lang="en-US"/>
               <a:t>Second level</a:t>
             </a:r>
           </a:p>
           <a:p>
             <a:pPr lvl="2"/>
             <a:r>
-              <a:rPr lang="en-US" smtClean="0"/>
+              <a:rPr lang="en-US"/>
               <a:t>Third level</a:t>
             </a:r>
           </a:p>
           <a:p>
             <a:pPr lvl="3"/>
             <a:r>
-              <a:rPr lang="en-US" smtClean="0"/>
+              <a:rPr lang="en-US"/>
               <a:t>Fourth level</a:t>
             </a:r>
           </a:p>
           <a:p>
             <a:pPr lvl="4"/>
             <a:r>
-              <a:rPr lang="en-US" smtClean="0"/>
+              <a:rPr lang="en-US"/>
               <a:t>Fifth level</a:t>
             </a:r>
-            <a:endParaRPr lang="en-US"/>
           </a:p>
         </p:txBody>
       </p:sp>
@@ -498,10 +513,9 @@
           <a:lstStyle/>
           <a:p>
             <a:r>
-              <a:rPr lang="en-US" smtClean="0"/>
+              <a:rPr lang="en-US"/>
               <a:t>Click to edit Master title style</a:t>
             </a:r>
-            <a:endParaRPr lang="en-US"/>
           </a:p>
         </p:txBody>
       </p:sp>
@@ -617,10 +631,9 @@
           </a:lstStyle>
           <a:p>
             <a:r>
-              <a:rPr lang="en-US" smtClean="0"/>
+              <a:rPr lang="en-US"/>
               <a:t>Click to edit Master subtitle style</a:t>
             </a:r>
-            <a:endParaRPr lang="en-US"/>
           </a:p>
         </p:txBody>
       </p:sp>
@@ -641,7 +654,7 @@
           <a:p>
             <a:fld id="{78C97017-6FC3-485B-9764-EAC9E56C1D49}" type="datetimeFigureOut">
               <a:rPr lang="en-US" smtClean="0"/>
-              <a:t>10/16/2016</a:t>
+              <a:t>4/8/2017</a:t>
             </a:fld>
             <a:endParaRPr lang="en-US"/>
           </a:p>
@@ -735,10 +748,9 @@
           <a:lstStyle/>
           <a:p>
             <a:r>
-              <a:rPr lang="en-US" smtClean="0"/>
+              <a:rPr lang="en-US"/>
               <a:t>Click to edit Master title style</a:t>
             </a:r>
-            <a:endParaRPr lang="en-US"/>
           </a:p>
         </p:txBody>
       </p:sp>
@@ -759,38 +771,37 @@
           <a:p>
             <a:pPr lvl="0"/>
             <a:r>
-              <a:rPr lang="en-US" smtClean="0"/>
+              <a:rPr lang="en-US"/>
               <a:t>Click to edit Master text styles</a:t>
             </a:r>
           </a:p>
           <a:p>
             <a:pPr lvl="1"/>
             <a:r>
-              <a:rPr lang="en-US" smtClean="0"/>
+              <a:rPr lang="en-US"/>
               <a:t>Second level</a:t>
             </a:r>
           </a:p>
           <a:p>
             <a:pPr lvl="2"/>
             <a:r>
-              <a:rPr lang="en-US" smtClean="0"/>
+              <a:rPr lang="en-US"/>
               <a:t>Third level</a:t>
             </a:r>
           </a:p>
           <a:p>
             <a:pPr lvl="3"/>
             <a:r>
-              <a:rPr lang="en-US" smtClean="0"/>
+              <a:rPr lang="en-US"/>
               <a:t>Fourth level</a:t>
             </a:r>
           </a:p>
           <a:p>
             <a:pPr lvl="4"/>
             <a:r>
-              <a:rPr lang="en-US" smtClean="0"/>
+              <a:rPr lang="en-US"/>
               <a:t>Fifth level</a:t>
             </a:r>
-            <a:endParaRPr lang="en-US"/>
           </a:p>
         </p:txBody>
       </p:sp>
@@ -811,7 +822,7 @@
           <a:p>
             <a:fld id="{78C97017-6FC3-485B-9764-EAC9E56C1D49}" type="datetimeFigureOut">
               <a:rPr lang="en-US" smtClean="0"/>
-              <a:t>10/16/2016</a:t>
+              <a:t>4/8/2017</a:t>
             </a:fld>
             <a:endParaRPr lang="en-US"/>
           </a:p>
@@ -910,10 +921,9 @@
           <a:lstStyle/>
           <a:p>
             <a:r>
-              <a:rPr lang="en-US" smtClean="0"/>
+              <a:rPr lang="en-US"/>
               <a:t>Click to edit Master title style</a:t>
             </a:r>
-            <a:endParaRPr lang="en-US"/>
           </a:p>
         </p:txBody>
       </p:sp>
@@ -939,38 +949,37 @@
           <a:p>
             <a:pPr lvl="0"/>
             <a:r>
-              <a:rPr lang="en-US" smtClean="0"/>
+              <a:rPr lang="en-US"/>
               <a:t>Click to edit Master text styles</a:t>
             </a:r>
           </a:p>
           <a:p>
             <a:pPr lvl="1"/>
             <a:r>
-              <a:rPr lang="en-US" smtClean="0"/>
+              <a:rPr lang="en-US"/>
               <a:t>Second level</a:t>
             </a:r>
           </a:p>
           <a:p>
             <a:pPr lvl="2"/>
             <a:r>
-              <a:rPr lang="en-US" smtClean="0"/>
+              <a:rPr lang="en-US"/>
               <a:t>Third level</a:t>
             </a:r>
           </a:p>
           <a:p>
             <a:pPr lvl="3"/>
             <a:r>
-              <a:rPr lang="en-US" smtClean="0"/>
+              <a:rPr lang="en-US"/>
               <a:t>Fourth level</a:t>
             </a:r>
           </a:p>
           <a:p>
             <a:pPr lvl="4"/>
             <a:r>
-              <a:rPr lang="en-US" smtClean="0"/>
+              <a:rPr lang="en-US"/>
               <a:t>Fifth level</a:t>
             </a:r>
-            <a:endParaRPr lang="en-US"/>
           </a:p>
         </p:txBody>
       </p:sp>
@@ -991,7 +1000,7 @@
           <a:p>
             <a:fld id="{78C97017-6FC3-485B-9764-EAC9E56C1D49}" type="datetimeFigureOut">
               <a:rPr lang="en-US" smtClean="0"/>
-              <a:t>10/16/2016</a:t>
+              <a:t>4/8/2017</a:t>
             </a:fld>
             <a:endParaRPr lang="en-US"/>
           </a:p>
@@ -1085,10 +1094,9 @@
           <a:lstStyle/>
           <a:p>
             <a:r>
-              <a:rPr lang="en-US" smtClean="0"/>
+              <a:rPr lang="en-US"/>
               <a:t>Click to edit Master title style</a:t>
             </a:r>
-            <a:endParaRPr lang="en-US"/>
           </a:p>
         </p:txBody>
       </p:sp>
@@ -1109,38 +1117,37 @@
           <a:p>
             <a:pPr lvl="0"/>
             <a:r>
-              <a:rPr lang="en-US" smtClean="0"/>
+              <a:rPr lang="en-US"/>
               <a:t>Click to edit Master text styles</a:t>
             </a:r>
           </a:p>
           <a:p>
             <a:pPr lvl="1"/>
             <a:r>
-              <a:rPr lang="en-US" smtClean="0"/>
+              <a:rPr lang="en-US"/>
               <a:t>Second level</a:t>
             </a:r>
           </a:p>
           <a:p>
             <a:pPr lvl="2"/>
             <a:r>
-              <a:rPr lang="en-US" smtClean="0"/>
+              <a:rPr lang="en-US"/>
               <a:t>Third level</a:t>
             </a:r>
           </a:p>
           <a:p>
             <a:pPr lvl="3"/>
             <a:r>
-              <a:rPr lang="en-US" smtClean="0"/>
+              <a:rPr lang="en-US"/>
               <a:t>Fourth level</a:t>
             </a:r>
           </a:p>
           <a:p>
             <a:pPr lvl="4"/>
             <a:r>
-              <a:rPr lang="en-US" smtClean="0"/>
+              <a:rPr lang="en-US"/>
               <a:t>Fifth level</a:t>
             </a:r>
-            <a:endParaRPr lang="en-US"/>
           </a:p>
         </p:txBody>
       </p:sp>
@@ -1161,7 +1168,7 @@
           <a:p>
             <a:fld id="{78C97017-6FC3-485B-9764-EAC9E56C1D49}" type="datetimeFigureOut">
               <a:rPr lang="en-US" smtClean="0"/>
-              <a:t>10/16/2016</a:t>
+              <a:t>4/8/2017</a:t>
             </a:fld>
             <a:endParaRPr lang="en-US"/>
           </a:p>
@@ -1264,10 +1271,9 @@
           </a:lstStyle>
           <a:p>
             <a:r>
-              <a:rPr lang="en-US" smtClean="0"/>
+              <a:rPr lang="en-US"/>
               <a:t>Click to edit Master title style</a:t>
             </a:r>
-            <a:endParaRPr lang="en-US"/>
           </a:p>
         </p:txBody>
       </p:sp>
@@ -1384,7 +1390,7 @@
           <a:p>
             <a:pPr lvl="0"/>
             <a:r>
-              <a:rPr lang="en-US" smtClean="0"/>
+              <a:rPr lang="en-US"/>
               <a:t>Click to edit Master text styles</a:t>
             </a:r>
           </a:p>
@@ -1407,7 +1413,7 @@
           <a:p>
             <a:fld id="{78C97017-6FC3-485B-9764-EAC9E56C1D49}" type="datetimeFigureOut">
               <a:rPr lang="en-US" smtClean="0"/>
-              <a:t>10/16/2016</a:t>
+              <a:t>4/8/2017</a:t>
             </a:fld>
             <a:endParaRPr lang="en-US"/>
           </a:p>
@@ -1501,10 +1507,9 @@
           <a:lstStyle/>
           <a:p>
             <a:r>
-              <a:rPr lang="en-US" smtClean="0"/>
+              <a:rPr lang="en-US"/>
               <a:t>Click to edit Master title style</a:t>
             </a:r>
-            <a:endParaRPr lang="en-US"/>
           </a:p>
         </p:txBody>
       </p:sp>
@@ -1558,38 +1563,37 @@
           <a:p>
             <a:pPr lvl="0"/>
             <a:r>
-              <a:rPr lang="en-US" smtClean="0"/>
+              <a:rPr lang="en-US"/>
               <a:t>Click to edit Master text styles</a:t>
             </a:r>
           </a:p>
           <a:p>
             <a:pPr lvl="1"/>
             <a:r>
-              <a:rPr lang="en-US" smtClean="0"/>
+              <a:rPr lang="en-US"/>
               <a:t>Second level</a:t>
             </a:r>
           </a:p>
           <a:p>
             <a:pPr lvl="2"/>
             <a:r>
-              <a:rPr lang="en-US" smtClean="0"/>
+              <a:rPr lang="en-US"/>
               <a:t>Third level</a:t>
             </a:r>
           </a:p>
           <a:p>
             <a:pPr lvl="3"/>
             <a:r>
-              <a:rPr lang="en-US" smtClean="0"/>
+              <a:rPr lang="en-US"/>
               <a:t>Fourth level</a:t>
             </a:r>
           </a:p>
           <a:p>
             <a:pPr lvl="4"/>
             <a:r>
-              <a:rPr lang="en-US" smtClean="0"/>
+              <a:rPr lang="en-US"/>
               <a:t>Fifth level</a:t>
             </a:r>
-            <a:endParaRPr lang="en-US"/>
           </a:p>
         </p:txBody>
       </p:sp>
@@ -1643,38 +1647,37 @@
           <a:p>
             <a:pPr lvl="0"/>
             <a:r>
-              <a:rPr lang="en-US" smtClean="0"/>
+              <a:rPr lang="en-US"/>
               <a:t>Click to edit Master text styles</a:t>
             </a:r>
           </a:p>
           <a:p>
             <a:pPr lvl="1"/>
             <a:r>
-              <a:rPr lang="en-US" smtClean="0"/>
+              <a:rPr lang="en-US"/>
               <a:t>Second level</a:t>
             </a:r>
           </a:p>
           <a:p>
             <a:pPr lvl="2"/>
             <a:r>
-              <a:rPr lang="en-US" smtClean="0"/>
+              <a:rPr lang="en-US"/>
               <a:t>Third level</a:t>
             </a:r>
           </a:p>
           <a:p>
             <a:pPr lvl="3"/>
             <a:r>
-              <a:rPr lang="en-US" smtClean="0"/>
+              <a:rPr lang="en-US"/>
               <a:t>Fourth level</a:t>
             </a:r>
           </a:p>
           <a:p>
             <a:pPr lvl="4"/>
             <a:r>
-              <a:rPr lang="en-US" smtClean="0"/>
+              <a:rPr lang="en-US"/>
               <a:t>Fifth level</a:t>
             </a:r>
-            <a:endParaRPr lang="en-US"/>
           </a:p>
         </p:txBody>
       </p:sp>
@@ -1695,7 +1698,7 @@
           <a:p>
             <a:fld id="{78C97017-6FC3-485B-9764-EAC9E56C1D49}" type="datetimeFigureOut">
               <a:rPr lang="en-US" smtClean="0"/>
-              <a:t>10/16/2016</a:t>
+              <a:t>4/8/2017</a:t>
             </a:fld>
             <a:endParaRPr lang="en-US"/>
           </a:p>
@@ -1793,10 +1796,9 @@
           </a:lstStyle>
           <a:p>
             <a:r>
-              <a:rPr lang="en-US" smtClean="0"/>
+              <a:rPr lang="en-US"/>
               <a:t>Click to edit Master title style</a:t>
             </a:r>
-            <a:endParaRPr lang="en-US"/>
           </a:p>
         </p:txBody>
       </p:sp>
@@ -1859,7 +1861,7 @@
           <a:p>
             <a:pPr lvl="0"/>
             <a:r>
-              <a:rPr lang="en-US" smtClean="0"/>
+              <a:rPr lang="en-US"/>
               <a:t>Click to edit Master text styles</a:t>
             </a:r>
           </a:p>
@@ -1915,38 +1917,37 @@
           <a:p>
             <a:pPr lvl="0"/>
             <a:r>
-              <a:rPr lang="en-US" smtClean="0"/>
+              <a:rPr lang="en-US"/>
               <a:t>Click to edit Master text styles</a:t>
             </a:r>
           </a:p>
           <a:p>
             <a:pPr lvl="1"/>
             <a:r>
-              <a:rPr lang="en-US" smtClean="0"/>
+              <a:rPr lang="en-US"/>
               <a:t>Second level</a:t>
             </a:r>
           </a:p>
           <a:p>
             <a:pPr lvl="2"/>
             <a:r>
-              <a:rPr lang="en-US" smtClean="0"/>
+              <a:rPr lang="en-US"/>
               <a:t>Third level</a:t>
             </a:r>
           </a:p>
           <a:p>
             <a:pPr lvl="3"/>
             <a:r>
-              <a:rPr lang="en-US" smtClean="0"/>
+              <a:rPr lang="en-US"/>
               <a:t>Fourth level</a:t>
             </a:r>
           </a:p>
           <a:p>
             <a:pPr lvl="4"/>
             <a:r>
-              <a:rPr lang="en-US" smtClean="0"/>
+              <a:rPr lang="en-US"/>
               <a:t>Fifth level</a:t>
             </a:r>
-            <a:endParaRPr lang="en-US"/>
           </a:p>
         </p:txBody>
       </p:sp>
@@ -2009,7 +2010,7 @@
           <a:p>
             <a:pPr lvl="0"/>
             <a:r>
-              <a:rPr lang="en-US" smtClean="0"/>
+              <a:rPr lang="en-US"/>
               <a:t>Click to edit Master text styles</a:t>
             </a:r>
           </a:p>
@@ -2065,38 +2066,37 @@
           <a:p>
             <a:pPr lvl="0"/>
             <a:r>
-              <a:rPr lang="en-US" smtClean="0"/>
+              <a:rPr lang="en-US"/>
               <a:t>Click to edit Master text styles</a:t>
             </a:r>
           </a:p>
           <a:p>
             <a:pPr lvl="1"/>
             <a:r>
-              <a:rPr lang="en-US" smtClean="0"/>
+              <a:rPr lang="en-US"/>
               <a:t>Second level</a:t>
             </a:r>
           </a:p>
           <a:p>
             <a:pPr lvl="2"/>
             <a:r>
-              <a:rPr lang="en-US" smtClean="0"/>
+              <a:rPr lang="en-US"/>
               <a:t>Third level</a:t>
             </a:r>
           </a:p>
           <a:p>
             <a:pPr lvl="3"/>
             <a:r>
-              <a:rPr lang="en-US" smtClean="0"/>
+              <a:rPr lang="en-US"/>
               <a:t>Fourth level</a:t>
             </a:r>
           </a:p>
           <a:p>
             <a:pPr lvl="4"/>
             <a:r>
-              <a:rPr lang="en-US" smtClean="0"/>
+              <a:rPr lang="en-US"/>
               <a:t>Fifth level</a:t>
             </a:r>
-            <a:endParaRPr lang="en-US"/>
           </a:p>
         </p:txBody>
       </p:sp>
@@ -2117,7 +2117,7 @@
           <a:p>
             <a:fld id="{78C97017-6FC3-485B-9764-EAC9E56C1D49}" type="datetimeFigureOut">
               <a:rPr lang="en-US" smtClean="0"/>
-              <a:t>10/16/2016</a:t>
+              <a:t>4/8/2017</a:t>
             </a:fld>
             <a:endParaRPr lang="en-US"/>
           </a:p>
@@ -2211,10 +2211,9 @@
           <a:lstStyle/>
           <a:p>
             <a:r>
-              <a:rPr lang="en-US" smtClean="0"/>
+              <a:rPr lang="en-US"/>
               <a:t>Click to edit Master title style</a:t>
             </a:r>
-            <a:endParaRPr lang="en-US"/>
           </a:p>
         </p:txBody>
       </p:sp>
@@ -2235,7 +2234,7 @@
           <a:p>
             <a:fld id="{78C97017-6FC3-485B-9764-EAC9E56C1D49}" type="datetimeFigureOut">
               <a:rPr lang="en-US" smtClean="0"/>
-              <a:t>10/16/2016</a:t>
+              <a:t>4/8/2017</a:t>
             </a:fld>
             <a:endParaRPr lang="en-US"/>
           </a:p>
@@ -2330,7 +2329,7 @@
           <a:p>
             <a:fld id="{78C97017-6FC3-485B-9764-EAC9E56C1D49}" type="datetimeFigureOut">
               <a:rPr lang="en-US" smtClean="0"/>
-              <a:t>10/16/2016</a:t>
+              <a:t>4/8/2017</a:t>
             </a:fld>
             <a:endParaRPr lang="en-US"/>
           </a:p>
@@ -2433,10 +2432,9 @@
           </a:lstStyle>
           <a:p>
             <a:r>
-              <a:rPr lang="en-US" smtClean="0"/>
+              <a:rPr lang="en-US"/>
               <a:t>Click to edit Master title style</a:t>
             </a:r>
-            <a:endParaRPr lang="en-US"/>
           </a:p>
         </p:txBody>
       </p:sp>
@@ -2490,38 +2488,37 @@
           <a:p>
             <a:pPr lvl="0"/>
             <a:r>
-              <a:rPr lang="en-US" smtClean="0"/>
+              <a:rPr lang="en-US"/>
               <a:t>Click to edit Master text styles</a:t>
             </a:r>
           </a:p>
           <a:p>
             <a:pPr lvl="1"/>
             <a:r>
-              <a:rPr lang="en-US" smtClean="0"/>
+              <a:rPr lang="en-US"/>
               <a:t>Second level</a:t>
             </a:r>
           </a:p>
           <a:p>
             <a:pPr lvl="2"/>
             <a:r>
-              <a:rPr lang="en-US" smtClean="0"/>
+              <a:rPr lang="en-US"/>
               <a:t>Third level</a:t>
             </a:r>
           </a:p>
           <a:p>
             <a:pPr lvl="3"/>
             <a:r>
-              <a:rPr lang="en-US" smtClean="0"/>
+              <a:rPr lang="en-US"/>
               <a:t>Fourth level</a:t>
             </a:r>
           </a:p>
           <a:p>
             <a:pPr lvl="4"/>
             <a:r>
-              <a:rPr lang="en-US" smtClean="0"/>
+              <a:rPr lang="en-US"/>
               <a:t>Fifth level</a:t>
             </a:r>
-            <a:endParaRPr lang="en-US"/>
           </a:p>
         </p:txBody>
       </p:sp>
@@ -2584,7 +2581,7 @@
           <a:p>
             <a:pPr lvl="0"/>
             <a:r>
-              <a:rPr lang="en-US" smtClean="0"/>
+              <a:rPr lang="en-US"/>
               <a:t>Click to edit Master text styles</a:t>
             </a:r>
           </a:p>
@@ -2607,7 +2604,7 @@
           <a:p>
             <a:fld id="{78C97017-6FC3-485B-9764-EAC9E56C1D49}" type="datetimeFigureOut">
               <a:rPr lang="en-US" smtClean="0"/>
-              <a:t>10/16/2016</a:t>
+              <a:t>4/8/2017</a:t>
             </a:fld>
             <a:endParaRPr lang="en-US"/>
           </a:p>
@@ -2710,10 +2707,9 @@
           </a:lstStyle>
           <a:p>
             <a:r>
-              <a:rPr lang="en-US" smtClean="0"/>
+              <a:rPr lang="en-US"/>
               <a:t>Click to edit Master title style</a:t>
             </a:r>
-            <a:endParaRPr lang="en-US"/>
           </a:p>
         </p:txBody>
       </p:sp>
@@ -2837,7 +2833,7 @@
           <a:p>
             <a:pPr lvl="0"/>
             <a:r>
-              <a:rPr lang="en-US" smtClean="0"/>
+              <a:rPr lang="en-US"/>
               <a:t>Click to edit Master text styles</a:t>
             </a:r>
           </a:p>
@@ -2860,7 +2856,7 @@
           <a:p>
             <a:fld id="{78C97017-6FC3-485B-9764-EAC9E56C1D49}" type="datetimeFigureOut">
               <a:rPr lang="en-US" smtClean="0"/>
-              <a:t>10/16/2016</a:t>
+              <a:t>4/8/2017</a:t>
             </a:fld>
             <a:endParaRPr lang="en-US"/>
           </a:p>
@@ -2969,10 +2965,9 @@
           <a:lstStyle/>
           <a:p>
             <a:r>
-              <a:rPr lang="en-US" smtClean="0"/>
+              <a:rPr lang="en-US"/>
               <a:t>Click to edit Master title style</a:t>
             </a:r>
-            <a:endParaRPr lang="en-US"/>
           </a:p>
         </p:txBody>
       </p:sp>
@@ -3003,38 +2998,37 @@
           <a:p>
             <a:pPr lvl="0"/>
             <a:r>
-              <a:rPr lang="en-US" smtClean="0"/>
+              <a:rPr lang="en-US"/>
               <a:t>Click to edit Master text styles</a:t>
             </a:r>
           </a:p>
           <a:p>
             <a:pPr lvl="1"/>
             <a:r>
-              <a:rPr lang="en-US" smtClean="0"/>
+              <a:rPr lang="en-US"/>
               <a:t>Second level</a:t>
             </a:r>
           </a:p>
           <a:p>
             <a:pPr lvl="2"/>
             <a:r>
-              <a:rPr lang="en-US" smtClean="0"/>
+              <a:rPr lang="en-US"/>
               <a:t>Third level</a:t>
             </a:r>
           </a:p>
           <a:p>
             <a:pPr lvl="3"/>
             <a:r>
-              <a:rPr lang="en-US" smtClean="0"/>
+              <a:rPr lang="en-US"/>
               <a:t>Fourth level</a:t>
             </a:r>
           </a:p>
           <a:p>
             <a:pPr lvl="4"/>
             <a:r>
-              <a:rPr lang="en-US" smtClean="0"/>
+              <a:rPr lang="en-US"/>
               <a:t>Fifth level</a:t>
             </a:r>
-            <a:endParaRPr lang="en-US"/>
           </a:p>
         </p:txBody>
       </p:sp>
@@ -3073,7 +3067,7 @@
           <a:p>
             <a:fld id="{78C97017-6FC3-485B-9764-EAC9E56C1D49}" type="datetimeFigureOut">
               <a:rPr lang="en-US" smtClean="0"/>
-              <a:t>10/16/2016</a:t>
+              <a:t>4/8/2017</a:t>
             </a:fld>
             <a:endParaRPr lang="en-US"/>
           </a:p>
@@ -3494,7 +3488,7 @@
           <a:lstStyle/>
           <a:p>
             <a:r>
-              <a:rPr lang="en-US" sz="1200" b="1" dirty="0" smtClean="0">
+              <a:rPr lang="en-US" sz="1200" b="1" dirty="0">
                 <a:solidFill>
                   <a:schemeClr val="accent6">
                     <a:lumMod val="75000"/>
@@ -3561,7 +3555,7 @@
           <a:p>
             <a:pPr algn="ctr"/>
             <a:r>
-              <a:rPr lang="en-US" sz="1050" dirty="0" smtClean="0">
+              <a:rPr lang="en-US" sz="1050" dirty="0">
                 <a:solidFill>
                   <a:schemeClr val="bg1"/>
                 </a:solidFill>
@@ -3569,19 +3563,27 @@
               <a:t>&lt;&lt;interface&gt;&gt;</a:t>
             </a:r>
             <a:br>
-              <a:rPr lang="en-US" sz="1050" dirty="0" smtClean="0">
+              <a:rPr lang="en-US" sz="1050" dirty="0">
                 <a:solidFill>
                   <a:schemeClr val="bg1"/>
                 </a:solidFill>
               </a:rPr>
             </a:br>
             <a:r>
-              <a:rPr lang="en-US" sz="1050" dirty="0" err="1" smtClean="0">
+              <a:rPr lang="en-US" altLang="zh-CN" sz="1050" dirty="0" err="1">
                 <a:solidFill>
                   <a:schemeClr val="bg1"/>
                 </a:solidFill>
               </a:rPr>
-              <a:t>AddressBookStorage</a:t>
+              <a:t>TaskList</a:t>
+            </a:r>
+            <a:r>
+              <a:rPr lang="en-US" sz="1050" dirty="0" err="1">
+                <a:solidFill>
+                  <a:schemeClr val="bg1"/>
+                </a:solidFill>
+              </a:rPr>
+              <a:t>Storage</a:t>
             </a:r>
             <a:endParaRPr lang="en-SG" sz="1050" dirty="0">
               <a:solidFill>
@@ -3639,7 +3641,7 @@
           <a:p>
             <a:pPr algn="ctr"/>
             <a:r>
-              <a:rPr lang="en-US" sz="1050" dirty="0" err="1" smtClean="0">
+              <a:rPr lang="en-US" sz="1050" dirty="0" err="1">
                 <a:solidFill>
                   <a:schemeClr val="bg1"/>
                 </a:solidFill>
@@ -3713,7 +3715,7 @@
           <a:p>
             <a:pPr algn="ctr"/>
             <a:r>
-              <a:rPr lang="en-US" sz="1050" dirty="0" smtClean="0">
+              <a:rPr lang="en-US" sz="1050" dirty="0">
                 <a:solidFill>
                   <a:schemeClr val="bg1"/>
                 </a:solidFill>
@@ -4147,27 +4149,17 @@
           <a:p>
             <a:pPr algn="ctr"/>
             <a:r>
-              <a:rPr lang="en-US" sz="1050" b="1" dirty="0" err="1" smtClean="0">
+              <a:rPr lang="en-US" sz="1050" b="1" dirty="0" err="1">
                 <a:solidFill>
                   <a:schemeClr val="accent6">
                     <a:lumMod val="75000"/>
                   </a:schemeClr>
                 </a:solidFill>
               </a:rPr>
-              <a:t>XmlAddressBook</a:t>
-            </a:r>
-            <a:r>
-              <a:rPr lang="en-US" sz="1050" b="1" dirty="0" smtClean="0">
-                <a:solidFill>
-                  <a:schemeClr val="accent6">
-                    <a:lumMod val="75000"/>
-                  </a:schemeClr>
-                </a:solidFill>
-              </a:rPr>
-              <a:t/>
+              <a:t>XmlTaskList</a:t>
             </a:r>
             <a:br>
-              <a:rPr lang="en-US" sz="1050" b="1" dirty="0" smtClean="0">
+              <a:rPr lang="en-US" sz="1050" b="1" dirty="0">
                 <a:solidFill>
                   <a:schemeClr val="accent6">
                     <a:lumMod val="75000"/>
@@ -4176,7 +4168,7 @@
               </a:rPr>
             </a:br>
             <a:r>
-              <a:rPr lang="en-US" sz="1050" b="1" dirty="0" smtClean="0">
+              <a:rPr lang="en-US" sz="1050" b="1" dirty="0">
                 <a:solidFill>
                   <a:schemeClr val="accent6">
                     <a:lumMod val="75000"/>
@@ -4243,7 +4235,7 @@
           <a:p>
             <a:pPr algn="ctr"/>
             <a:r>
-              <a:rPr lang="en-US" sz="1050" dirty="0" smtClean="0">
+              <a:rPr lang="en-US" sz="1050" dirty="0">
                 <a:solidFill>
                   <a:schemeClr val="bg1"/>
                 </a:solidFill>
@@ -4251,14 +4243,14 @@
               <a:t>&lt;&lt;interface&gt;&gt;</a:t>
             </a:r>
             <a:br>
-              <a:rPr lang="en-US" sz="1050" dirty="0" smtClean="0">
+              <a:rPr lang="en-US" sz="1050" dirty="0">
                 <a:solidFill>
                   <a:schemeClr val="bg1"/>
                 </a:solidFill>
               </a:rPr>
             </a:br>
             <a:r>
-              <a:rPr lang="en-US" sz="1050" dirty="0" err="1" smtClean="0">
+              <a:rPr lang="en-US" sz="1050" dirty="0" err="1">
                 <a:solidFill>
                   <a:schemeClr val="bg1"/>
                 </a:solidFill>
@@ -4516,30 +4508,22 @@
           <a:p>
             <a:pPr algn="ctr"/>
             <a:r>
-              <a:rPr lang="en-US" sz="1050" dirty="0" err="1" smtClean="0">
+              <a:rPr lang="en-US" sz="1050" dirty="0" err="1">
                 <a:solidFill>
                   <a:schemeClr val="bg1"/>
                 </a:solidFill>
               </a:rPr>
               <a:t>JsonUserPrefs</a:t>
             </a:r>
-            <a:r>
-              <a:rPr lang="en-US" sz="1050" dirty="0" smtClean="0">
-                <a:solidFill>
-                  <a:schemeClr val="bg1"/>
-                </a:solidFill>
-              </a:rPr>
-              <a:t/>
-            </a:r>
             <a:br>
-              <a:rPr lang="en-US" sz="1050" dirty="0" smtClean="0">
+              <a:rPr lang="en-US" sz="1050" dirty="0">
                 <a:solidFill>
                   <a:schemeClr val="bg1"/>
                 </a:solidFill>
               </a:rPr>
             </a:br>
             <a:r>
-              <a:rPr lang="en-US" sz="1050" dirty="0" smtClean="0">
+              <a:rPr lang="en-US" sz="1050" dirty="0">
                 <a:solidFill>
                   <a:schemeClr val="bg1"/>
                 </a:solidFill>
@@ -4591,7 +4575,7 @@
           <a:p>
             <a:pPr algn="ctr"/>
             <a:r>
-              <a:rPr lang="en-US" sz="1050" b="1" dirty="0" err="1" smtClean="0">
+              <a:rPr lang="en-US" sz="1050" b="1" dirty="0" err="1">
                 <a:solidFill>
                   <a:schemeClr val="accent6">
                     <a:lumMod val="75000"/>
@@ -4600,18 +4584,8 @@
               </a:rPr>
               <a:t>XmlSerializable</a:t>
             </a:r>
-            <a:r>
-              <a:rPr lang="en-US" sz="1050" b="1" dirty="0" smtClean="0">
-                <a:solidFill>
-                  <a:schemeClr val="accent6">
-                    <a:lumMod val="75000"/>
-                  </a:schemeClr>
-                </a:solidFill>
-              </a:rPr>
-              <a:t/>
-            </a:r>
             <a:br>
-              <a:rPr lang="en-US" sz="1050" b="1" dirty="0" smtClean="0">
+              <a:rPr lang="en-US" sz="1050" b="1" dirty="0">
                 <a:solidFill>
                   <a:schemeClr val="accent6">
                     <a:lumMod val="75000"/>
@@ -4620,14 +4594,14 @@
               </a:rPr>
             </a:br>
             <a:r>
-              <a:rPr lang="en-US" sz="1050" b="1" dirty="0" err="1" smtClean="0">
+              <a:rPr lang="en-US" sz="1050" b="1" dirty="0" err="1">
                 <a:solidFill>
                   <a:schemeClr val="accent6">
                     <a:lumMod val="75000"/>
                   </a:schemeClr>
                 </a:solidFill>
               </a:rPr>
-              <a:t>AddressBook</a:t>
+              <a:t>TaskList</a:t>
             </a:r>
             <a:endParaRPr lang="en-SG" sz="1050" b="1" dirty="0">
               <a:solidFill>
@@ -4717,7 +4691,7 @@
           <a:p>
             <a:pPr algn="ctr"/>
             <a:r>
-              <a:rPr lang="en-US" sz="1050" b="1" dirty="0" err="1" smtClean="0">
+              <a:rPr lang="en-US" sz="1050" b="1" dirty="0" err="1">
                 <a:solidFill>
                   <a:schemeClr val="accent6">
                     <a:lumMod val="75000"/>
@@ -4773,14 +4747,14 @@
           <a:p>
             <a:pPr algn="ctr"/>
             <a:r>
-              <a:rPr lang="en-US" sz="1050" b="1" dirty="0" err="1" smtClean="0">
+              <a:rPr lang="en-US" sz="1050" b="1" dirty="0" err="1">
                 <a:solidFill>
                   <a:schemeClr val="accent6">
                     <a:lumMod val="75000"/>
                   </a:schemeClr>
                 </a:solidFill>
               </a:rPr>
-              <a:t>XmlAdaptedPerson</a:t>
+              <a:t>XmlAdaptedTask</a:t>
             </a:r>
             <a:endParaRPr lang="en-SG" sz="1050" b="1" dirty="0">
               <a:solidFill>
@@ -4843,13 +4817,6 @@
   <p:clrMapOvr>
     <a:masterClrMapping/>
   </p:clrMapOvr>
-  <p:timing>
-    <p:tnLst>
-      <p:par>
-        <p:cTn id="1" dur="indefinite" restart="never" nodeType="tmRoot"/>
-      </p:par>
-    </p:tnLst>
-  </p:timing>
 </p:sld>
 </file>
 

</xml_diff>